<commit_message>
final version of web scraper
</commit_message>
<xml_diff>
--- a/web scraping/AI-Core prezzy.pptx
+++ b/web scraping/AI-Core prezzy.pptx
@@ -18,6 +18,9 @@
     <p:sldId id="283" r:id="rId12"/>
     <p:sldId id="284" r:id="rId13"/>
     <p:sldId id="285" r:id="rId14"/>
+    <p:sldId id="288" r:id="rId15"/>
+    <p:sldId id="286" r:id="rId16"/>
+    <p:sldId id="287" r:id="rId17"/>
   </p:sldIdLst>
   <p:sldSz cx="12192000" cy="6858000"/>
   <p:notesSz cx="6858000" cy="9144000"/>
@@ -6796,7 +6799,10 @@
           <a:bodyPr/>
           <a:lstStyle/>
           <a:p>
-            <a:endParaRPr lang="en-GB"/>
+            <a:r>
+              <a:rPr lang="en-GB" dirty="0"/>
+              <a:t>Interesting error!</a:t>
+            </a:r>
           </a:p>
         </p:txBody>
       </p:sp>
@@ -6806,6 +6812,260 @@
             <a:extLst>
               <a:ext uri="{FF2B5EF4-FFF2-40B4-BE49-F238E27FC236}">
                 <a16:creationId xmlns:a16="http://schemas.microsoft.com/office/drawing/2014/main" id="{FFAABD50-2E13-43AB-8F26-0BF0EF1E1008}"/>
+              </a:ext>
+            </a:extLst>
+          </p:cNvPr>
+          <p:cNvPicPr>
+            <a:picLocks noGrp="1" noChangeAspect="1"/>
+          </p:cNvPicPr>
+          <p:nvPr>
+            <p:ph idx="1"/>
+          </p:nvPr>
+        </p:nvPicPr>
+        <p:blipFill rotWithShape="1">
+          <a:blip r:embed="rId2">
+            <a:extLst>
+              <a:ext uri="{28A0092B-C50C-407E-A947-70E740481C1C}">
+                <a14:useLocalDpi xmlns:a14="http://schemas.microsoft.com/office/drawing/2010/main" val="0"/>
+              </a:ext>
+            </a:extLst>
+          </a:blip>
+          <a:srcRect r="40308"/>
+          <a:stretch/>
+        </p:blipFill>
+        <p:spPr>
+          <a:xfrm>
+            <a:off x="1194145" y="1325461"/>
+            <a:ext cx="3203474" cy="299155"/>
+          </a:xfrm>
+        </p:spPr>
+      </p:pic>
+      <p:pic>
+        <p:nvPicPr>
+          <p:cNvPr id="4" name="Picture 3">
+            <a:extLst>
+              <a:ext uri="{FF2B5EF4-FFF2-40B4-BE49-F238E27FC236}">
+                <a16:creationId xmlns:a16="http://schemas.microsoft.com/office/drawing/2014/main" id="{55461B7D-42F7-4AB4-8680-DFEE2B9D8FDD}"/>
+              </a:ext>
+            </a:extLst>
+          </p:cNvPr>
+          <p:cNvPicPr>
+            <a:picLocks noChangeAspect="1"/>
+          </p:cNvPicPr>
+          <p:nvPr/>
+        </p:nvPicPr>
+        <p:blipFill rotWithShape="1">
+          <a:blip r:embed="rId3">
+            <a:extLst>
+              <a:ext uri="{28A0092B-C50C-407E-A947-70E740481C1C}">
+                <a14:useLocalDpi xmlns:a14="http://schemas.microsoft.com/office/drawing/2010/main" val="0"/>
+              </a:ext>
+            </a:extLst>
+          </a:blip>
+          <a:srcRect t="36228" b="11742"/>
+          <a:stretch/>
+        </p:blipFill>
+        <p:spPr>
+          <a:xfrm>
+            <a:off x="1328369" y="1624616"/>
+            <a:ext cx="3203475" cy="228632"/>
+          </a:xfrm>
+          <a:prstGeom prst="rect">
+            <a:avLst/>
+          </a:prstGeom>
+        </p:spPr>
+      </p:pic>
+    </p:spTree>
+    <p:extLst>
+      <p:ext uri="{BB962C8B-B14F-4D97-AF65-F5344CB8AC3E}">
+        <p14:creationId xmlns:p14="http://schemas.microsoft.com/office/powerpoint/2010/main" val="1521295419"/>
+      </p:ext>
+    </p:extLst>
+  </p:cSld>
+  <p:clrMapOvr>
+    <a:masterClrMapping/>
+  </p:clrMapOvr>
+</p:sld>
+</file>
+
+<file path=ppt/slides/slide14.xml><?xml version="1.0" encoding="utf-8"?>
+<p:sld xmlns:a="http://schemas.openxmlformats.org/drawingml/2006/main" xmlns:r="http://schemas.openxmlformats.org/officeDocument/2006/relationships" xmlns:p="http://schemas.openxmlformats.org/presentationml/2006/main">
+  <p:cSld>
+    <p:spTree>
+      <p:nvGrpSpPr>
+        <p:cNvPr id="1" name=""/>
+        <p:cNvGrpSpPr/>
+        <p:nvPr/>
+      </p:nvGrpSpPr>
+      <p:grpSpPr>
+        <a:xfrm>
+          <a:off x="0" y="0"/>
+          <a:ext cx="0" cy="0"/>
+          <a:chOff x="0" y="0"/>
+          <a:chExt cx="0" cy="0"/>
+        </a:xfrm>
+      </p:grpSpPr>
+      <p:sp>
+        <p:nvSpPr>
+          <p:cNvPr id="2" name="Title 1">
+            <a:extLst>
+              <a:ext uri="{FF2B5EF4-FFF2-40B4-BE49-F238E27FC236}">
+                <a16:creationId xmlns:a16="http://schemas.microsoft.com/office/drawing/2014/main" id="{54EF0CAB-9463-4815-996C-827127649A38}"/>
+              </a:ext>
+            </a:extLst>
+          </p:cNvPr>
+          <p:cNvSpPr>
+            <a:spLocks noGrp="1"/>
+          </p:cNvSpPr>
+          <p:nvPr>
+            <p:ph type="title"/>
+          </p:nvPr>
+        </p:nvSpPr>
+        <p:spPr/>
+        <p:txBody>
+          <a:bodyPr/>
+          <a:lstStyle/>
+          <a:p>
+            <a:r>
+              <a:rPr lang="en-GB" dirty="0"/>
+              <a:t>Interesting error!</a:t>
+            </a:r>
+          </a:p>
+        </p:txBody>
+      </p:sp>
+      <p:pic>
+        <p:nvPicPr>
+          <p:cNvPr id="5" name="Content Placeholder 4">
+            <a:extLst>
+              <a:ext uri="{FF2B5EF4-FFF2-40B4-BE49-F238E27FC236}">
+                <a16:creationId xmlns:a16="http://schemas.microsoft.com/office/drawing/2014/main" id="{FFAABD50-2E13-43AB-8F26-0BF0EF1E1008}"/>
+              </a:ext>
+            </a:extLst>
+          </p:cNvPr>
+          <p:cNvPicPr>
+            <a:picLocks noGrp="1" noChangeAspect="1"/>
+          </p:cNvPicPr>
+          <p:nvPr>
+            <p:ph idx="1"/>
+          </p:nvPr>
+        </p:nvPicPr>
+        <p:blipFill rotWithShape="1">
+          <a:blip r:embed="rId2">
+            <a:extLst>
+              <a:ext uri="{28A0092B-C50C-407E-A947-70E740481C1C}">
+                <a14:useLocalDpi xmlns:a14="http://schemas.microsoft.com/office/drawing/2010/main" val="0"/>
+              </a:ext>
+            </a:extLst>
+          </a:blip>
+          <a:srcRect r="26149"/>
+          <a:stretch/>
+        </p:blipFill>
+        <p:spPr>
+          <a:xfrm>
+            <a:off x="1328369" y="1325461"/>
+            <a:ext cx="3203475" cy="299155"/>
+          </a:xfrm>
+        </p:spPr>
+      </p:pic>
+      <p:pic>
+        <p:nvPicPr>
+          <p:cNvPr id="4" name="Picture 3">
+            <a:extLst>
+              <a:ext uri="{FF2B5EF4-FFF2-40B4-BE49-F238E27FC236}">
+                <a16:creationId xmlns:a16="http://schemas.microsoft.com/office/drawing/2014/main" id="{55461B7D-42F7-4AB4-8680-DFEE2B9D8FDD}"/>
+              </a:ext>
+            </a:extLst>
+          </p:cNvPr>
+          <p:cNvPicPr>
+            <a:picLocks noChangeAspect="1"/>
+          </p:cNvPicPr>
+          <p:nvPr/>
+        </p:nvPicPr>
+        <p:blipFill rotWithShape="1">
+          <a:blip r:embed="rId3">
+            <a:extLst>
+              <a:ext uri="{28A0092B-C50C-407E-A947-70E740481C1C}">
+                <a14:useLocalDpi xmlns:a14="http://schemas.microsoft.com/office/drawing/2010/main" val="0"/>
+              </a:ext>
+            </a:extLst>
+          </a:blip>
+          <a:srcRect t="36228" b="11742"/>
+          <a:stretch/>
+        </p:blipFill>
+        <p:spPr>
+          <a:xfrm>
+            <a:off x="1328369" y="1624616"/>
+            <a:ext cx="3203475" cy="228632"/>
+          </a:xfrm>
+          <a:prstGeom prst="rect">
+            <a:avLst/>
+          </a:prstGeom>
+        </p:spPr>
+      </p:pic>
+    </p:spTree>
+    <p:extLst>
+      <p:ext uri="{BB962C8B-B14F-4D97-AF65-F5344CB8AC3E}">
+        <p14:creationId xmlns:p14="http://schemas.microsoft.com/office/powerpoint/2010/main" val="3111212257"/>
+      </p:ext>
+    </p:extLst>
+  </p:cSld>
+  <p:clrMapOvr>
+    <a:masterClrMapping/>
+  </p:clrMapOvr>
+</p:sld>
+</file>
+
+<file path=ppt/slides/slide15.xml><?xml version="1.0" encoding="utf-8"?>
+<p:sld xmlns:a="http://schemas.openxmlformats.org/drawingml/2006/main" xmlns:r="http://schemas.openxmlformats.org/officeDocument/2006/relationships" xmlns:p="http://schemas.openxmlformats.org/presentationml/2006/main">
+  <p:cSld>
+    <p:spTree>
+      <p:nvGrpSpPr>
+        <p:cNvPr id="1" name=""/>
+        <p:cNvGrpSpPr/>
+        <p:nvPr/>
+      </p:nvGrpSpPr>
+      <p:grpSpPr>
+        <a:xfrm>
+          <a:off x="0" y="0"/>
+          <a:ext cx="0" cy="0"/>
+          <a:chOff x="0" y="0"/>
+          <a:chExt cx="0" cy="0"/>
+        </a:xfrm>
+      </p:grpSpPr>
+      <p:sp>
+        <p:nvSpPr>
+          <p:cNvPr id="2" name="Title 1">
+            <a:extLst>
+              <a:ext uri="{FF2B5EF4-FFF2-40B4-BE49-F238E27FC236}">
+                <a16:creationId xmlns:a16="http://schemas.microsoft.com/office/drawing/2014/main" id="{3DFCB665-E64B-49DA-900E-E1E0F1CDC8BD}"/>
+              </a:ext>
+            </a:extLst>
+          </p:cNvPr>
+          <p:cNvSpPr>
+            <a:spLocks noGrp="1"/>
+          </p:cNvSpPr>
+          <p:nvPr>
+            <p:ph type="title"/>
+          </p:nvPr>
+        </p:nvSpPr>
+        <p:spPr/>
+        <p:txBody>
+          <a:bodyPr/>
+          <a:lstStyle/>
+          <a:p>
+            <a:r>
+              <a:rPr lang="en-GB" dirty="0"/>
+              <a:t>Cleaning the data</a:t>
+            </a:r>
+          </a:p>
+        </p:txBody>
+      </p:sp>
+      <p:pic>
+        <p:nvPicPr>
+          <p:cNvPr id="5" name="Content Placeholder 4" descr="Graphical user interface, text, application, email, Excel&#10;&#10;Description automatically generated">
+            <a:extLst>
+              <a:ext uri="{FF2B5EF4-FFF2-40B4-BE49-F238E27FC236}">
+                <a16:creationId xmlns:a16="http://schemas.microsoft.com/office/drawing/2014/main" id="{9C3F827A-DE27-4F1A-AF30-3ABA4A12C393}"/>
               </a:ext>
             </a:extLst>
           </p:cNvPr>
@@ -6830,15 +7090,105 @@
         </p:blipFill>
         <p:spPr>
           <a:xfrm>
-            <a:off x="4237036" y="2377123"/>
-            <a:ext cx="3315163" cy="228632"/>
+            <a:off x="323137" y="1152982"/>
+            <a:ext cx="11106178" cy="4613335"/>
           </a:xfrm>
         </p:spPr>
       </p:pic>
     </p:spTree>
     <p:extLst>
       <p:ext uri="{BB962C8B-B14F-4D97-AF65-F5344CB8AC3E}">
-        <p14:creationId xmlns:p14="http://schemas.microsoft.com/office/powerpoint/2010/main" val="1521295419"/>
+        <p14:creationId xmlns:p14="http://schemas.microsoft.com/office/powerpoint/2010/main" val="2899726508"/>
+      </p:ext>
+    </p:extLst>
+  </p:cSld>
+  <p:clrMapOvr>
+    <a:masterClrMapping/>
+  </p:clrMapOvr>
+</p:sld>
+</file>
+
+<file path=ppt/slides/slide16.xml><?xml version="1.0" encoding="utf-8"?>
+<p:sld xmlns:a="http://schemas.openxmlformats.org/drawingml/2006/main" xmlns:r="http://schemas.openxmlformats.org/officeDocument/2006/relationships" xmlns:p="http://schemas.openxmlformats.org/presentationml/2006/main">
+  <p:cSld>
+    <p:spTree>
+      <p:nvGrpSpPr>
+        <p:cNvPr id="1" name=""/>
+        <p:cNvGrpSpPr/>
+        <p:nvPr/>
+      </p:nvGrpSpPr>
+      <p:grpSpPr>
+        <a:xfrm>
+          <a:off x="0" y="0"/>
+          <a:ext cx="0" cy="0"/>
+          <a:chOff x="0" y="0"/>
+          <a:chExt cx="0" cy="0"/>
+        </a:xfrm>
+      </p:grpSpPr>
+      <p:sp>
+        <p:nvSpPr>
+          <p:cNvPr id="2" name="Title 1">
+            <a:extLst>
+              <a:ext uri="{FF2B5EF4-FFF2-40B4-BE49-F238E27FC236}">
+                <a16:creationId xmlns:a16="http://schemas.microsoft.com/office/drawing/2014/main" id="{4500F107-EEDC-4933-B1F3-8F5E8EAC1662}"/>
+              </a:ext>
+            </a:extLst>
+          </p:cNvPr>
+          <p:cNvSpPr>
+            <a:spLocks noGrp="1"/>
+          </p:cNvSpPr>
+          <p:nvPr>
+            <p:ph type="title"/>
+          </p:nvPr>
+        </p:nvSpPr>
+        <p:spPr/>
+        <p:txBody>
+          <a:bodyPr/>
+          <a:lstStyle/>
+          <a:p>
+            <a:endParaRPr lang="en-GB" dirty="0"/>
+          </a:p>
+        </p:txBody>
+      </p:sp>
+      <p:pic>
+        <p:nvPicPr>
+          <p:cNvPr id="5" name="Content Placeholder 4" descr="Table, Excel&#10;&#10;Description automatically generated">
+            <a:extLst>
+              <a:ext uri="{FF2B5EF4-FFF2-40B4-BE49-F238E27FC236}">
+                <a16:creationId xmlns:a16="http://schemas.microsoft.com/office/drawing/2014/main" id="{E7AC6F63-92DE-457E-A45D-6B014487034B}"/>
+              </a:ext>
+            </a:extLst>
+          </p:cNvPr>
+          <p:cNvPicPr>
+            <a:picLocks noGrp="1" noChangeAspect="1"/>
+          </p:cNvPicPr>
+          <p:nvPr>
+            <p:ph idx="1"/>
+          </p:nvPr>
+        </p:nvPicPr>
+        <p:blipFill>
+          <a:blip r:embed="rId2">
+            <a:extLst>
+              <a:ext uri="{28A0092B-C50C-407E-A947-70E740481C1C}">
+                <a14:useLocalDpi xmlns:a14="http://schemas.microsoft.com/office/drawing/2010/main" val="0"/>
+              </a:ext>
+            </a:extLst>
+          </a:blip>
+          <a:stretch>
+            <a:fillRect/>
+          </a:stretch>
+        </p:blipFill>
+        <p:spPr>
+          <a:xfrm>
+            <a:off x="247747" y="452717"/>
+            <a:ext cx="11545170" cy="5509543"/>
+          </a:xfrm>
+        </p:spPr>
+      </p:pic>
+    </p:spTree>
+    <p:extLst>
+      <p:ext uri="{BB962C8B-B14F-4D97-AF65-F5344CB8AC3E}">
+        <p14:creationId xmlns:p14="http://schemas.microsoft.com/office/powerpoint/2010/main" val="3063796195"/>
       </p:ext>
     </p:extLst>
   </p:cSld>

</xml_diff>